<commit_message>
Added local contact info
</commit_message>
<xml_diff>
--- a/2017/Beginner/YoungCoders_2017_beginner.pptx
+++ b/2017/Beginner/YoungCoders_2017_beginner.pptx
@@ -38241,6 +38241,29 @@
               <a:rPr u="sng">
                 <a:hlinkClick r:id="rId4" invalidUrl="" action="" tgtFrame="" tooltip="" history="1" highlightClick="0" endSnd="0"/>
               </a:rPr>
+              <a:t>CodeWars.com</a:t>
+            </a:r>
+          </a:p>
+          <a:p>
+            <a:pPr marL="635000" indent="-635000">
+              <a:spcBef>
+                <a:spcPts val="2000"/>
+              </a:spcBef>
+              <a:buFont typeface="Zapf Dingbats"/>
+              <a:defRPr>
+                <a:solidFill>
+                  <a:srgbClr val="000000"/>
+                </a:solidFill>
+                <a:latin typeface="+mj-lt"/>
+                <a:ea typeface="+mj-ea"/>
+                <a:cs typeface="+mj-cs"/>
+                <a:sym typeface="Gill Sans"/>
+              </a:defRPr>
+            </a:pPr>
+            <a:r>
+              <a:rPr u="sng">
+                <a:hlinkClick r:id="rId5" invalidUrl="" action="" tgtFrame="" tooltip="" history="1" highlightClick="0" endSnd="0"/>
+              </a:rPr>
               <a:t>CodeAcademy.com</a:t>
             </a:r>
           </a:p>
@@ -38381,7 +38404,10 @@
               </a:defRPr>
             </a:pPr>
             <a:r>
-              <a:t>AppMill</a:t>
+              <a:rPr u="sng">
+                <a:hlinkClick r:id="rId4" invalidUrl="" action="" tgtFrame="" tooltip="" history="1" highlightClick="0" endSnd="0"/>
+              </a:rPr>
+              <a:t>notebooks.azure.com</a:t>
             </a:r>
           </a:p>
         </p:txBody>
@@ -38463,7 +38489,7 @@
       </p:sp>
       <p:sp>
         <p:nvSpPr>
-          <p:cNvPr id="648" name="python-learners’ mailing list…"/>
+          <p:cNvPr id="648" name="help@python.org…"/>
           <p:cNvSpPr/>
           <p:nvPr>
             <p:ph type="body" idx="4294967295"/>
@@ -38498,7 +38524,7 @@
               </a:defRPr>
             </a:pPr>
             <a:r>
-              <a:t>python-learners’ mailing list</a:t>
+              <a:t>help@python.org</a:t>
             </a:r>
           </a:p>
           <a:p>
@@ -38517,6 +38543,12 @@
                 <a:sym typeface="Gill Sans"/>
               </a:defRPr>
             </a:pPr>
+            <a:r>
+              <a:rPr u="sng">
+                <a:hlinkClick r:id="rId3" invalidUrl="" action="" tgtFrame="" tooltip="" history="1" highlightClick="0" endSnd="0"/>
+              </a:rPr>
+              <a:t>reddit.com/r/learnpython</a:t>
+            </a:r>
           </a:p>
           <a:p>
             <a:pPr marL="635000" indent="-635000">
@@ -38535,27 +38567,10 @@
               </a:defRPr>
             </a:pPr>
             <a:r>
-              <a:t>web search</a:t>
-            </a:r>
-          </a:p>
-          <a:p>
-            <a:pPr marL="635000" indent="-635000">
-              <a:spcBef>
-                <a:spcPts val="2000"/>
-              </a:spcBef>
-              <a:buFont typeface="Zapf Dingbats"/>
-              <a:defRPr>
-                <a:solidFill>
-                  <a:srgbClr val="000000"/>
-                </a:solidFill>
-                <a:latin typeface="+mj-lt"/>
-                <a:ea typeface="+mj-ea"/>
-                <a:cs typeface="+mj-cs"/>
-                <a:sym typeface="Gill Sans"/>
-              </a:defRPr>
-            </a:pPr>
-            <a:r>
-              <a:t>Stay in touch!</a:t>
+              <a:rPr u="sng">
+                <a:hlinkClick r:id="rId4" invalidUrl="" action="" tgtFrame="" tooltip="" history="1" highlightClick="0" endSnd="0"/>
+              </a:rPr>
+              <a:t>https://groups.google.com/forum/#!forum/young-coders-outside-in</a:t>
             </a:r>
           </a:p>
         </p:txBody>
@@ -38637,7 +38652,7 @@
       </p:sp>
       <p:sp>
         <p:nvSpPr>
-          <p:cNvPr id="653" name="PyPDX…"/>
+          <p:cNvPr id="653" name="PDXPython…"/>
           <p:cNvSpPr/>
           <p:nvPr>
             <p:ph type="body" idx="4294967295"/>
@@ -38672,7 +38687,7 @@
               </a:defRPr>
             </a:pPr>
             <a:r>
-              <a:t>PyPDX</a:t>
+              <a:t>PDXPython</a:t>
             </a:r>
           </a:p>
           <a:p>
@@ -38692,7 +38707,7 @@
               </a:defRPr>
             </a:pPr>
             <a:r>
-              <a:t>PyLadies</a:t>
+              <a:t>PyLadies PDX</a:t>
             </a:r>
           </a:p>
           <a:p>
@@ -38712,7 +38727,7 @@
               </a:defRPr>
             </a:pPr>
             <a:r>
-              <a:t>GirlDevelopIt</a:t>
+              <a:t>Girl Develop It - Portland</a:t>
             </a:r>
           </a:p>
         </p:txBody>

</xml_diff>